<commit_message>
version finale pour la presentation
</commit_message>
<xml_diff>
--- a/Processus d’affaire.pptx
+++ b/Processus d’affaire.pptx
@@ -5,10 +5,10 @@
     <p:sldMasterId id="2147483840" r:id="rId2"/>
   </p:sldMasterIdLst>
   <p:notesMasterIdLst>
-    <p:notesMasterId r:id="rId11"/>
+    <p:notesMasterId r:id="rId12"/>
   </p:notesMasterIdLst>
   <p:handoutMasterIdLst>
-    <p:handoutMasterId r:id="rId12"/>
+    <p:handoutMasterId r:id="rId13"/>
   </p:handoutMasterIdLst>
   <p:sldIdLst>
     <p:sldId id="258" r:id="rId3"/>
@@ -18,7 +18,8 @@
     <p:sldId id="264" r:id="rId7"/>
     <p:sldId id="261" r:id="rId8"/>
     <p:sldId id="262" r:id="rId9"/>
-    <p:sldId id="265" r:id="rId10"/>
+    <p:sldId id="266" r:id="rId10"/>
+    <p:sldId id="265" r:id="rId11"/>
   </p:sldIdLst>
   <p:sldSz cx="12192000" cy="6858000"/>
   <p:notesSz cx="6858000" cy="9144000"/>
@@ -3738,10 +3739,10 @@
             <a:p>
               <a:pPr algn="ctr"/>
               <a:r>
-                <a:rPr lang="fr-CA" dirty="0" smtClean="0"/>
+                <a:rPr lang="fr-CA" smtClean="0"/>
                 <a:t>V</a:t>
               </a:r>
-              <a:endParaRPr lang="en-US" dirty="0"/>
+              <a:endParaRPr lang="en-US"/>
             </a:p>
           </p:txBody>
         </p:sp>
@@ -4039,7 +4040,7 @@
           <a:lstStyle/>
           <a:p>
             <a:r>
-              <a:rPr lang="fr-CA" dirty="0" smtClean="0">
+              <a:rPr lang="fr-CA" smtClean="0">
                 <a:solidFill>
                   <a:schemeClr val="bg1"/>
                 </a:solidFill>
@@ -4047,7 +4048,7 @@
               </a:rPr>
               <a:t>Félix La Rocque Carrier</a:t>
             </a:r>
-            <a:endParaRPr lang="en-US" dirty="0">
+            <a:endParaRPr lang="en-US">
               <a:solidFill>
                 <a:schemeClr val="bg1"/>
               </a:solidFill>
@@ -4079,7 +4080,7 @@
           <a:lstStyle/>
           <a:p>
             <a:r>
-              <a:rPr lang="fr-CA" dirty="0" smtClean="0">
+              <a:rPr lang="fr-CA" smtClean="0">
                 <a:solidFill>
                   <a:schemeClr val="bg1"/>
                 </a:solidFill>
@@ -4088,7 +4089,7 @@
               <a:t>Sébastien </a:t>
             </a:r>
             <a:r>
-              <a:rPr lang="fr-CA" dirty="0" err="1" smtClean="0">
+              <a:rPr lang="fr-CA" err="1" smtClean="0">
                 <a:solidFill>
                   <a:schemeClr val="bg1"/>
                 </a:solidFill>
@@ -4096,7 +4097,7 @@
               </a:rPr>
               <a:t>Crevier</a:t>
             </a:r>
-            <a:endParaRPr lang="en-US" dirty="0">
+            <a:endParaRPr lang="en-US">
               <a:solidFill>
                 <a:schemeClr val="bg1"/>
               </a:solidFill>
@@ -4128,7 +4129,7 @@
           <a:lstStyle/>
           <a:p>
             <a:r>
-              <a:rPr lang="fr-CA" dirty="0" smtClean="0">
+              <a:rPr lang="fr-CA" smtClean="0">
                 <a:solidFill>
                   <a:schemeClr val="bg1"/>
                 </a:solidFill>
@@ -4136,7 +4137,7 @@
               </a:rPr>
               <a:t>Sébastien Bernard</a:t>
             </a:r>
-            <a:endParaRPr lang="en-US" dirty="0">
+            <a:endParaRPr lang="en-US">
               <a:solidFill>
                 <a:schemeClr val="bg1"/>
               </a:solidFill>
@@ -4169,7 +4170,7 @@
           <a:p>
             <a:pPr algn="ctr"/>
             <a:r>
-              <a:rPr lang="fr-CA" dirty="0" smtClean="0">
+              <a:rPr lang="fr-CA" smtClean="0">
                 <a:solidFill>
                   <a:schemeClr val="bg1"/>
                 </a:solidFill>
@@ -4181,7 +4182,7 @@
           <a:p>
             <a:pPr algn="ctr"/>
             <a:r>
-              <a:rPr lang="fr-CA" dirty="0" err="1" smtClean="0">
+              <a:rPr lang="fr-CA" err="1" smtClean="0">
                 <a:solidFill>
                   <a:schemeClr val="bg1"/>
                 </a:solidFill>
@@ -4190,7 +4191,7 @@
               <a:t>Improvised</a:t>
             </a:r>
             <a:r>
-              <a:rPr lang="fr-CA" dirty="0" smtClean="0">
+              <a:rPr lang="fr-CA" smtClean="0">
                 <a:solidFill>
                   <a:schemeClr val="bg1"/>
                 </a:solidFill>
@@ -4198,7 +4199,7 @@
               </a:rPr>
               <a:t> Designer</a:t>
             </a:r>
-            <a:endParaRPr lang="en-US" dirty="0">
+            <a:endParaRPr lang="en-US">
               <a:solidFill>
                 <a:schemeClr val="bg1"/>
               </a:solidFill>
@@ -4230,7 +4231,7 @@
           <a:lstStyle/>
           <a:p>
             <a:r>
-              <a:rPr lang="fr-CA" dirty="0" smtClean="0">
+              <a:rPr lang="fr-CA" smtClean="0">
                 <a:solidFill>
                   <a:schemeClr val="bg1"/>
                 </a:solidFill>
@@ -4238,7 +4239,7 @@
               </a:rPr>
               <a:t>Dev C#</a:t>
             </a:r>
-            <a:endParaRPr lang="en-US" dirty="0">
+            <a:endParaRPr lang="en-US">
               <a:solidFill>
                 <a:schemeClr val="bg1"/>
               </a:solidFill>
@@ -4300,7 +4301,7 @@
           <a:lstStyle/>
           <a:p>
             <a:r>
-              <a:rPr lang="fr-CA" dirty="0" smtClean="0">
+              <a:rPr lang="fr-CA" smtClean="0">
                 <a:solidFill>
                   <a:schemeClr val="bg1"/>
                 </a:solidFill>
@@ -4308,7 +4309,7 @@
               </a:rPr>
               <a:t>Dev C#</a:t>
             </a:r>
-            <a:endParaRPr lang="en-US" dirty="0">
+            <a:endParaRPr lang="en-US">
               <a:solidFill>
                 <a:schemeClr val="bg1"/>
               </a:solidFill>
@@ -4370,7 +4371,7 @@
           <a:lstStyle/>
           <a:p>
             <a:r>
-              <a:rPr lang="fr-CA" dirty="0" smtClean="0">
+              <a:rPr lang="fr-CA" smtClean="0">
                 <a:solidFill>
                   <a:schemeClr val="bg1"/>
                 </a:solidFill>
@@ -4378,7 +4379,7 @@
               </a:rPr>
               <a:t>Alex Gagné</a:t>
             </a:r>
-            <a:endParaRPr lang="en-US" dirty="0">
+            <a:endParaRPr lang="en-US">
               <a:solidFill>
                 <a:schemeClr val="bg1"/>
               </a:solidFill>
@@ -4410,7 +4411,7 @@
           <a:lstStyle/>
           <a:p>
             <a:r>
-              <a:rPr lang="fr-CA" dirty="0" smtClean="0">
+              <a:rPr lang="fr-CA" smtClean="0">
                 <a:solidFill>
                   <a:schemeClr val="bg1"/>
                 </a:solidFill>
@@ -4418,7 +4419,7 @@
               </a:rPr>
               <a:t>Dev C#</a:t>
             </a:r>
-            <a:endParaRPr lang="en-US" dirty="0">
+            <a:endParaRPr lang="en-US">
               <a:solidFill>
                 <a:schemeClr val="bg1"/>
               </a:solidFill>
@@ -4613,10 +4614,10 @@
             <a:p>
               <a:pPr algn="ctr"/>
               <a:r>
-                <a:rPr lang="fr-CA" dirty="0" smtClean="0"/>
+                <a:rPr lang="fr-CA" smtClean="0"/>
                 <a:t>V</a:t>
               </a:r>
-              <a:endParaRPr lang="en-US" dirty="0"/>
+              <a:endParaRPr lang="en-US"/>
             </a:p>
           </p:txBody>
         </p:sp>
@@ -4722,7 +4723,7 @@
           <a:lstStyle/>
           <a:p>
             <a:r>
-              <a:rPr lang="fr-CA" sz="3600" dirty="0" err="1" smtClean="0">
+              <a:rPr lang="fr-CA" sz="3600" err="1" smtClean="0">
                 <a:solidFill>
                   <a:schemeClr val="bg1"/>
                 </a:solidFill>
@@ -4731,7 +4732,7 @@
               <a:t>What</a:t>
             </a:r>
             <a:r>
-              <a:rPr lang="fr-CA" sz="3600" dirty="0" smtClean="0">
+              <a:rPr lang="fr-CA" sz="3600" smtClean="0">
                 <a:solidFill>
                   <a:schemeClr val="bg1"/>
                 </a:solidFill>
@@ -4740,7 +4741,7 @@
               <a:t> </a:t>
             </a:r>
             <a:r>
-              <a:rPr lang="fr-CA" sz="3600" dirty="0" err="1" smtClean="0">
+              <a:rPr lang="fr-CA" sz="3600" err="1" smtClean="0">
                 <a:solidFill>
                   <a:schemeClr val="bg1"/>
                 </a:solidFill>
@@ -4749,7 +4750,7 @@
               <a:t>Happens</a:t>
             </a:r>
             <a:r>
-              <a:rPr lang="fr-CA" sz="3600" dirty="0" smtClean="0">
+              <a:rPr lang="fr-CA" sz="3600" smtClean="0">
                 <a:solidFill>
                   <a:schemeClr val="bg1"/>
                 </a:solidFill>
@@ -4757,7 +4758,7 @@
               </a:rPr>
               <a:t> ??</a:t>
             </a:r>
-            <a:endParaRPr lang="en-US" sz="3600" dirty="0">
+            <a:endParaRPr lang="en-US" sz="3600">
               <a:solidFill>
                 <a:schemeClr val="bg1"/>
               </a:solidFill>
@@ -4766,9 +4767,209 @@
           </a:p>
         </p:txBody>
       </p:sp>
+      <p:sp>
+        <p:nvSpPr>
+          <p:cNvPr id="8" name="ZoneTexte 7"/>
+          <p:cNvSpPr txBox="1"/>
+          <p:nvPr/>
+        </p:nvSpPr>
+        <p:spPr>
+          <a:xfrm>
+            <a:off x="6145495" y="2751501"/>
+            <a:ext cx="1008609" cy="1200329"/>
+          </a:xfrm>
+          <a:prstGeom prst="rect">
+            <a:avLst/>
+          </a:prstGeom>
+          <a:noFill/>
+        </p:spPr>
+        <p:txBody>
+          <a:bodyPr wrap="none" rtlCol="0">
+            <a:spAutoFit/>
+          </a:bodyPr>
+          <a:lstStyle/>
+          <a:p>
+            <a:r>
+              <a:rPr lang="fr-CA" sz="7200" smtClean="0">
+                <a:solidFill>
+                  <a:schemeClr val="bg1"/>
+                </a:solidFill>
+                <a:latin typeface="Verdana Pro Black" panose="020B0A04030504040204" pitchFamily="34" charset="0"/>
+              </a:rPr>
+              <a:t>+</a:t>
+            </a:r>
+            <a:endParaRPr lang="en-US" sz="7200">
+              <a:solidFill>
+                <a:schemeClr val="bg1"/>
+              </a:solidFill>
+              <a:latin typeface="Verdana Pro Black" panose="020B0A04030504040204" pitchFamily="34" charset="0"/>
+            </a:endParaRPr>
+          </a:p>
+        </p:txBody>
+      </p:sp>
+      <p:sp>
+        <p:nvSpPr>
+          <p:cNvPr id="9" name="ZoneTexte 8"/>
+          <p:cNvSpPr txBox="1"/>
+          <p:nvPr/>
+        </p:nvSpPr>
+        <p:spPr>
+          <a:xfrm>
+            <a:off x="7154104" y="3978563"/>
+            <a:ext cx="2685351" cy="646331"/>
+          </a:xfrm>
+          <a:prstGeom prst="rect">
+            <a:avLst/>
+          </a:prstGeom>
+          <a:noFill/>
+        </p:spPr>
+        <p:txBody>
+          <a:bodyPr wrap="none" rtlCol="0">
+            <a:spAutoFit/>
+          </a:bodyPr>
+          <a:lstStyle/>
+          <a:p>
+            <a:r>
+              <a:rPr lang="fr-CA" sz="3600" err="1" smtClean="0">
+                <a:solidFill>
+                  <a:schemeClr val="bg1"/>
+                </a:solidFill>
+                <a:latin typeface="Verdana Pro Black" panose="020B0A04030504040204" pitchFamily="34" charset="0"/>
+              </a:rPr>
+              <a:t>Activities</a:t>
+            </a:r>
+            <a:endParaRPr lang="en-US" sz="3600">
+              <a:solidFill>
+                <a:schemeClr val="bg1"/>
+              </a:solidFill>
+              <a:latin typeface="Verdana Pro Black" panose="020B0A04030504040204" pitchFamily="34" charset="0"/>
+            </a:endParaRPr>
+          </a:p>
+        </p:txBody>
+      </p:sp>
+      <p:sp>
+        <p:nvSpPr>
+          <p:cNvPr id="10" name="ZoneTexte 9"/>
+          <p:cNvSpPr txBox="1"/>
+          <p:nvPr/>
+        </p:nvSpPr>
+        <p:spPr>
+          <a:xfrm>
+            <a:off x="9534068" y="2733496"/>
+            <a:ext cx="2233304" cy="1200329"/>
+          </a:xfrm>
+          <a:prstGeom prst="rect">
+            <a:avLst/>
+          </a:prstGeom>
+          <a:noFill/>
+        </p:spPr>
+        <p:txBody>
+          <a:bodyPr wrap="none" rtlCol="0">
+            <a:spAutoFit/>
+          </a:bodyPr>
+          <a:lstStyle/>
+          <a:p>
+            <a:r>
+              <a:rPr lang="fr-CA" sz="7200" smtClean="0">
+                <a:solidFill>
+                  <a:schemeClr val="bg1"/>
+                </a:solidFill>
+                <a:latin typeface="Verdana Pro Black" panose="020B0A04030504040204" pitchFamily="34" charset="0"/>
+              </a:rPr>
+              <a:t>=  ?</a:t>
+            </a:r>
+            <a:endParaRPr lang="en-US" sz="7200">
+              <a:solidFill>
+                <a:schemeClr val="bg1"/>
+              </a:solidFill>
+              <a:latin typeface="Verdana Pro Black" panose="020B0A04030504040204" pitchFamily="34" charset="0"/>
+            </a:endParaRPr>
+          </a:p>
+        </p:txBody>
+      </p:sp>
+      <p:sp>
+        <p:nvSpPr>
+          <p:cNvPr id="15" name="ZoneTexte 14"/>
+          <p:cNvSpPr txBox="1"/>
+          <p:nvPr/>
+        </p:nvSpPr>
+        <p:spPr>
+          <a:xfrm>
+            <a:off x="2009393" y="2733494"/>
+            <a:ext cx="1008609" cy="1200329"/>
+          </a:xfrm>
+          <a:prstGeom prst="rect">
+            <a:avLst/>
+          </a:prstGeom>
+          <a:noFill/>
+        </p:spPr>
+        <p:txBody>
+          <a:bodyPr wrap="none" rtlCol="0">
+            <a:spAutoFit/>
+          </a:bodyPr>
+          <a:lstStyle/>
+          <a:p>
+            <a:r>
+              <a:rPr lang="fr-CA" sz="7200" smtClean="0">
+                <a:solidFill>
+                  <a:schemeClr val="bg1"/>
+                </a:solidFill>
+                <a:latin typeface="Verdana Pro Black" panose="020B0A04030504040204" pitchFamily="34" charset="0"/>
+              </a:rPr>
+              <a:t>+</a:t>
+            </a:r>
+            <a:endParaRPr lang="en-US" sz="7200">
+              <a:solidFill>
+                <a:schemeClr val="bg1"/>
+              </a:solidFill>
+              <a:latin typeface="Verdana Pro Black" panose="020B0A04030504040204" pitchFamily="34" charset="0"/>
+            </a:endParaRPr>
+          </a:p>
+        </p:txBody>
+      </p:sp>
+      <p:sp>
+        <p:nvSpPr>
+          <p:cNvPr id="16" name="ZoneTexte 15"/>
+          <p:cNvSpPr txBox="1"/>
+          <p:nvPr/>
+        </p:nvSpPr>
+        <p:spPr>
+          <a:xfrm>
+            <a:off x="3379290" y="4006514"/>
+            <a:ext cx="2775119" cy="646331"/>
+          </a:xfrm>
+          <a:prstGeom prst="rect">
+            <a:avLst/>
+          </a:prstGeom>
+          <a:noFill/>
+        </p:spPr>
+        <p:txBody>
+          <a:bodyPr wrap="none" rtlCol="0">
+            <a:spAutoFit/>
+          </a:bodyPr>
+          <a:lstStyle/>
+          <a:p>
+            <a:r>
+              <a:rPr lang="fr-CA" sz="3600" err="1" smtClean="0">
+                <a:solidFill>
+                  <a:schemeClr val="bg1"/>
+                </a:solidFill>
+                <a:latin typeface="Verdana Pro Black" panose="020B0A04030504040204" pitchFamily="34" charset="0"/>
+              </a:rPr>
+              <a:t>Collegues</a:t>
+            </a:r>
+            <a:endParaRPr lang="en-US" sz="3600">
+              <a:solidFill>
+                <a:schemeClr val="bg1"/>
+              </a:solidFill>
+              <a:latin typeface="Verdana Pro Black" panose="020B0A04030504040204" pitchFamily="34" charset="0"/>
+            </a:endParaRPr>
+          </a:p>
+        </p:txBody>
+      </p:sp>
       <p:pic>
         <p:nvPicPr>
-          <p:cNvPr id="7" name="Image 6"/>
+          <p:cNvPr id="17" name="Image 16"/>
           <p:cNvPicPr>
             <a:picLocks noChangeAspect="1"/>
           </p:cNvPicPr>
@@ -4788,8 +4989,8 @@
         </p:blipFill>
         <p:spPr>
           <a:xfrm>
-            <a:off x="7449654" y="2266969"/>
-            <a:ext cx="1858773" cy="1858773"/>
+            <a:off x="293122" y="2153397"/>
+            <a:ext cx="1506336" cy="1638536"/>
           </a:xfrm>
           <a:prstGeom prst="rect">
             <a:avLst/>
@@ -4798,14 +4999,14 @@
       </p:pic>
       <p:sp>
         <p:nvSpPr>
-          <p:cNvPr id="8" name="ZoneTexte 7"/>
+          <p:cNvPr id="18" name="ZoneTexte 17"/>
           <p:cNvSpPr txBox="1"/>
           <p:nvPr/>
         </p:nvSpPr>
         <p:spPr>
           <a:xfrm>
-            <a:off x="6145495" y="2751501"/>
-            <a:ext cx="1008609" cy="1200329"/>
+            <a:off x="442996" y="4013844"/>
+            <a:ext cx="1279517" cy="646331"/>
           </a:xfrm>
           <a:prstGeom prst="rect">
             <a:avLst/>
@@ -4819,15 +5020,15 @@
           <a:lstStyle/>
           <a:p>
             <a:r>
-              <a:rPr lang="fr-CA" sz="7200" dirty="0" smtClean="0">
+              <a:rPr lang="fr-CA" sz="3600" smtClean="0">
                 <a:solidFill>
                   <a:schemeClr val="bg1"/>
                 </a:solidFill>
                 <a:latin typeface="Verdana Pro Black" panose="020B0A04030504040204" pitchFamily="34" charset="0"/>
               </a:rPr>
-              <a:t>+</a:t>
-            </a:r>
-            <a:endParaRPr lang="en-US" sz="7200" dirty="0">
+              <a:t>Max</a:t>
+            </a:r>
+            <a:endParaRPr lang="en-US" sz="3600">
               <a:solidFill>
                 <a:schemeClr val="bg1"/>
               </a:solidFill>
@@ -4836,169 +5037,9 @@
           </a:p>
         </p:txBody>
       </p:sp>
-      <p:sp>
-        <p:nvSpPr>
-          <p:cNvPr id="9" name="ZoneTexte 8"/>
-          <p:cNvSpPr txBox="1"/>
-          <p:nvPr/>
-        </p:nvSpPr>
-        <p:spPr>
-          <a:xfrm>
-            <a:off x="7154104" y="3978563"/>
-            <a:ext cx="2685351" cy="646331"/>
-          </a:xfrm>
-          <a:prstGeom prst="rect">
-            <a:avLst/>
-          </a:prstGeom>
-          <a:noFill/>
-        </p:spPr>
-        <p:txBody>
-          <a:bodyPr wrap="none" rtlCol="0">
-            <a:spAutoFit/>
-          </a:bodyPr>
-          <a:lstStyle/>
-          <a:p>
-            <a:r>
-              <a:rPr lang="fr-CA" sz="3600" dirty="0" err="1" smtClean="0">
-                <a:solidFill>
-                  <a:schemeClr val="bg1"/>
-                </a:solidFill>
-                <a:latin typeface="Verdana Pro Black" panose="020B0A04030504040204" pitchFamily="34" charset="0"/>
-              </a:rPr>
-              <a:t>Activities</a:t>
-            </a:r>
-            <a:endParaRPr lang="en-US" sz="3600" dirty="0">
-              <a:solidFill>
-                <a:schemeClr val="bg1"/>
-              </a:solidFill>
-              <a:latin typeface="Verdana Pro Black" panose="020B0A04030504040204" pitchFamily="34" charset="0"/>
-            </a:endParaRPr>
-          </a:p>
-        </p:txBody>
-      </p:sp>
-      <p:sp>
-        <p:nvSpPr>
-          <p:cNvPr id="10" name="ZoneTexte 9"/>
-          <p:cNvSpPr txBox="1"/>
-          <p:nvPr/>
-        </p:nvSpPr>
-        <p:spPr>
-          <a:xfrm>
-            <a:off x="9534068" y="2733496"/>
-            <a:ext cx="2233304" cy="1200329"/>
-          </a:xfrm>
-          <a:prstGeom prst="rect">
-            <a:avLst/>
-          </a:prstGeom>
-          <a:noFill/>
-        </p:spPr>
-        <p:txBody>
-          <a:bodyPr wrap="none" rtlCol="0">
-            <a:spAutoFit/>
-          </a:bodyPr>
-          <a:lstStyle/>
-          <a:p>
-            <a:r>
-              <a:rPr lang="fr-CA" sz="7200" dirty="0" smtClean="0">
-                <a:solidFill>
-                  <a:schemeClr val="bg1"/>
-                </a:solidFill>
-                <a:latin typeface="Verdana Pro Black" panose="020B0A04030504040204" pitchFamily="34" charset="0"/>
-              </a:rPr>
-              <a:t>=  ?</a:t>
-            </a:r>
-            <a:endParaRPr lang="en-US" sz="7200" dirty="0">
-              <a:solidFill>
-                <a:schemeClr val="bg1"/>
-              </a:solidFill>
-              <a:latin typeface="Verdana Pro Black" panose="020B0A04030504040204" pitchFamily="34" charset="0"/>
-            </a:endParaRPr>
-          </a:p>
-        </p:txBody>
-      </p:sp>
-      <p:sp>
-        <p:nvSpPr>
-          <p:cNvPr id="15" name="ZoneTexte 14"/>
-          <p:cNvSpPr txBox="1"/>
-          <p:nvPr/>
-        </p:nvSpPr>
-        <p:spPr>
-          <a:xfrm>
-            <a:off x="2009393" y="2733494"/>
-            <a:ext cx="1008609" cy="1200329"/>
-          </a:xfrm>
-          <a:prstGeom prst="rect">
-            <a:avLst/>
-          </a:prstGeom>
-          <a:noFill/>
-        </p:spPr>
-        <p:txBody>
-          <a:bodyPr wrap="none" rtlCol="0">
-            <a:spAutoFit/>
-          </a:bodyPr>
-          <a:lstStyle/>
-          <a:p>
-            <a:r>
-              <a:rPr lang="fr-CA" sz="7200" dirty="0" smtClean="0">
-                <a:solidFill>
-                  <a:schemeClr val="bg1"/>
-                </a:solidFill>
-                <a:latin typeface="Verdana Pro Black" panose="020B0A04030504040204" pitchFamily="34" charset="0"/>
-              </a:rPr>
-              <a:t>+</a:t>
-            </a:r>
-            <a:endParaRPr lang="en-US" sz="7200" dirty="0">
-              <a:solidFill>
-                <a:schemeClr val="bg1"/>
-              </a:solidFill>
-              <a:latin typeface="Verdana Pro Black" panose="020B0A04030504040204" pitchFamily="34" charset="0"/>
-            </a:endParaRPr>
-          </a:p>
-        </p:txBody>
-      </p:sp>
-      <p:sp>
-        <p:nvSpPr>
-          <p:cNvPr id="16" name="ZoneTexte 15"/>
-          <p:cNvSpPr txBox="1"/>
-          <p:nvPr/>
-        </p:nvSpPr>
-        <p:spPr>
-          <a:xfrm>
-            <a:off x="3379290" y="4006514"/>
-            <a:ext cx="2775119" cy="646331"/>
-          </a:xfrm>
-          <a:prstGeom prst="rect">
-            <a:avLst/>
-          </a:prstGeom>
-          <a:noFill/>
-        </p:spPr>
-        <p:txBody>
-          <a:bodyPr wrap="none" rtlCol="0">
-            <a:spAutoFit/>
-          </a:bodyPr>
-          <a:lstStyle/>
-          <a:p>
-            <a:r>
-              <a:rPr lang="fr-CA" sz="3600" dirty="0" err="1" smtClean="0">
-                <a:solidFill>
-                  <a:schemeClr val="bg1"/>
-                </a:solidFill>
-                <a:latin typeface="Verdana Pro Black" panose="020B0A04030504040204" pitchFamily="34" charset="0"/>
-              </a:rPr>
-              <a:t>Collegues</a:t>
-            </a:r>
-            <a:endParaRPr lang="en-US" sz="3600" dirty="0">
-              <a:solidFill>
-                <a:schemeClr val="bg1"/>
-              </a:solidFill>
-              <a:latin typeface="Verdana Pro Black" panose="020B0A04030504040204" pitchFamily="34" charset="0"/>
-            </a:endParaRPr>
-          </a:p>
-        </p:txBody>
-      </p:sp>
       <p:pic>
         <p:nvPicPr>
-          <p:cNvPr id="17" name="Image 16"/>
+          <p:cNvPr id="19" name="Image 18"/>
           <p:cNvPicPr>
             <a:picLocks noChangeAspect="1"/>
           </p:cNvPicPr>
@@ -5018,54 +5059,14 @@
         </p:blipFill>
         <p:spPr>
           <a:xfrm>
-            <a:off x="293122" y="2153397"/>
-            <a:ext cx="1506336" cy="1638536"/>
+            <a:off x="7317106" y="1947653"/>
+            <a:ext cx="2053959" cy="2058861"/>
           </a:xfrm>
           <a:prstGeom prst="rect">
             <a:avLst/>
           </a:prstGeom>
         </p:spPr>
       </p:pic>
-      <p:sp>
-        <p:nvSpPr>
-          <p:cNvPr id="18" name="ZoneTexte 17"/>
-          <p:cNvSpPr txBox="1"/>
-          <p:nvPr/>
-        </p:nvSpPr>
-        <p:spPr>
-          <a:xfrm>
-            <a:off x="442996" y="4013844"/>
-            <a:ext cx="1356462" cy="646331"/>
-          </a:xfrm>
-          <a:prstGeom prst="rect">
-            <a:avLst/>
-          </a:prstGeom>
-          <a:noFill/>
-        </p:spPr>
-        <p:txBody>
-          <a:bodyPr wrap="none" rtlCol="0">
-            <a:spAutoFit/>
-          </a:bodyPr>
-          <a:lstStyle/>
-          <a:p>
-            <a:r>
-              <a:rPr lang="fr-CA" sz="3600" dirty="0" smtClean="0">
-                <a:solidFill>
-                  <a:schemeClr val="bg1"/>
-                </a:solidFill>
-                <a:latin typeface="Verdana Pro Black" panose="020B0A04030504040204" pitchFamily="34" charset="0"/>
-              </a:rPr>
-              <a:t>Nick</a:t>
-            </a:r>
-            <a:endParaRPr lang="en-US" sz="3600" dirty="0">
-              <a:solidFill>
-                <a:schemeClr val="bg1"/>
-              </a:solidFill>
-              <a:latin typeface="Verdana Pro Black" panose="020B0A04030504040204" pitchFamily="34" charset="0"/>
-            </a:endParaRPr>
-          </a:p>
-        </p:txBody>
-      </p:sp>
     </p:spTree>
     <p:extLst>
       <p:ext uri="{BB962C8B-B14F-4D97-AF65-F5344CB8AC3E}">
@@ -5162,10 +5163,10 @@
             <a:p>
               <a:pPr algn="ctr"/>
               <a:r>
-                <a:rPr lang="fr-CA" dirty="0" smtClean="0"/>
+                <a:rPr lang="fr-CA" smtClean="0"/>
                 <a:t>V</a:t>
               </a:r>
-              <a:endParaRPr lang="en-US" dirty="0"/>
+              <a:endParaRPr lang="en-US"/>
             </a:p>
           </p:txBody>
         </p:sp>
@@ -5241,7 +5242,7 @@
           <a:lstStyle/>
           <a:p>
             <a:r>
-              <a:rPr lang="fr-CA" sz="3600" dirty="0" smtClean="0">
+              <a:rPr lang="fr-CA" sz="3600" smtClean="0">
                 <a:solidFill>
                   <a:schemeClr val="bg1"/>
                 </a:solidFill>
@@ -5249,7 +5250,7 @@
               </a:rPr>
               <a:t>Money Management</a:t>
             </a:r>
-            <a:endParaRPr lang="en-US" sz="3600" dirty="0">
+            <a:endParaRPr lang="en-US" sz="3600">
               <a:solidFill>
                 <a:schemeClr val="bg1"/>
               </a:solidFill>
@@ -5333,7 +5334,7 @@
         </p:nvGrpSpPr>
         <p:grpSpPr>
           <a:xfrm>
-            <a:off x="0" y="-109680"/>
+            <a:off x="0" y="0"/>
             <a:ext cx="12192000" cy="6858000"/>
             <a:chOff x="0" y="0"/>
             <a:chExt cx="12192000" cy="6858000"/>
@@ -5384,10 +5385,10 @@
             <a:p>
               <a:pPr algn="ctr"/>
               <a:r>
-                <a:rPr lang="fr-CA" dirty="0" smtClean="0"/>
+                <a:rPr lang="fr-CA" smtClean="0"/>
                 <a:t>V</a:t>
               </a:r>
-              <a:endParaRPr lang="en-US" dirty="0"/>
+              <a:endParaRPr lang="en-US"/>
             </a:p>
           </p:txBody>
         </p:sp>
@@ -5463,7 +5464,7 @@
           <a:lstStyle/>
           <a:p>
             <a:r>
-              <a:rPr lang="fr-CA" sz="3600" dirty="0" smtClean="0">
+              <a:rPr lang="fr-CA" sz="3600" smtClean="0">
                 <a:solidFill>
                   <a:schemeClr val="bg1"/>
                 </a:solidFill>
@@ -5472,7 +5473,7 @@
               <a:t>IOU - </a:t>
             </a:r>
             <a:r>
-              <a:rPr lang="fr-CA" sz="3600" dirty="0" err="1" smtClean="0">
+              <a:rPr lang="fr-CA" sz="3600" err="1" smtClean="0">
                 <a:solidFill>
                   <a:schemeClr val="bg1"/>
                 </a:solidFill>
@@ -5480,7 +5481,7 @@
               </a:rPr>
               <a:t>Slack</a:t>
             </a:r>
-            <a:endParaRPr lang="en-US" sz="3600" dirty="0">
+            <a:endParaRPr lang="en-US" sz="3600">
               <a:solidFill>
                 <a:schemeClr val="bg1"/>
               </a:solidFill>
@@ -5723,7 +5724,7 @@
         </p:nvGrpSpPr>
         <p:grpSpPr>
           <a:xfrm>
-            <a:off x="0" y="-109680"/>
+            <a:off x="0" y="0"/>
             <a:ext cx="12192000" cy="6858000"/>
             <a:chOff x="0" y="0"/>
             <a:chExt cx="12192000" cy="6858000"/>
@@ -5774,10 +5775,10 @@
             <a:p>
               <a:pPr algn="ctr"/>
               <a:r>
-                <a:rPr lang="fr-CA" dirty="0" smtClean="0"/>
+                <a:rPr lang="fr-CA" smtClean="0"/>
                 <a:t>V</a:t>
               </a:r>
-              <a:endParaRPr lang="en-US" dirty="0"/>
+              <a:endParaRPr lang="en-US"/>
             </a:p>
           </p:txBody>
         </p:sp>
@@ -5830,6 +5831,30 @@
           </p:spPr>
         </p:pic>
       </p:grpSp>
+      <p:pic>
+        <p:nvPicPr>
+          <p:cNvPr id="8" name="Image 7"/>
+          <p:cNvPicPr>
+            <a:picLocks noChangeAspect="1"/>
+          </p:cNvPicPr>
+          <p:nvPr/>
+        </p:nvPicPr>
+        <p:blipFill>
+          <a:blip r:embed="rId4"/>
+          <a:stretch>
+            <a:fillRect/>
+          </a:stretch>
+        </p:blipFill>
+        <p:spPr>
+          <a:xfrm>
+            <a:off x="293122" y="963035"/>
+            <a:ext cx="4429125" cy="904875"/>
+          </a:xfrm>
+          <a:prstGeom prst="rect">
+            <a:avLst/>
+          </a:prstGeom>
+        </p:spPr>
+      </p:pic>
     </p:spTree>
     <p:extLst>
       <p:ext uri="{BB962C8B-B14F-4D97-AF65-F5344CB8AC3E}">
@@ -5926,10 +5951,10 @@
             <a:p>
               <a:pPr algn="ctr"/>
               <a:r>
-                <a:rPr lang="fr-CA" dirty="0" smtClean="0"/>
+                <a:rPr lang="fr-CA" smtClean="0"/>
                 <a:t>V</a:t>
               </a:r>
-              <a:endParaRPr lang="en-US" dirty="0"/>
+              <a:endParaRPr lang="en-US"/>
             </a:p>
           </p:txBody>
         </p:sp>
@@ -6005,7 +6030,7 @@
           <a:lstStyle/>
           <a:p>
             <a:r>
-              <a:rPr lang="fr-CA" sz="3600" dirty="0" err="1" smtClean="0">
+              <a:rPr lang="fr-CA" sz="3600" err="1" smtClean="0">
                 <a:solidFill>
                   <a:schemeClr val="bg1"/>
                 </a:solidFill>
@@ -6013,7 +6038,7 @@
               </a:rPr>
               <a:t>Competitors</a:t>
             </a:r>
-            <a:endParaRPr lang="en-US" sz="3600" dirty="0">
+            <a:endParaRPr lang="en-US" sz="3600">
               <a:solidFill>
                 <a:schemeClr val="bg1"/>
               </a:solidFill>
@@ -6075,7 +6100,7 @@
           <a:lstStyle/>
           <a:p>
             <a:r>
-              <a:rPr lang="fr-CA" dirty="0" err="1" smtClean="0">
+              <a:rPr lang="fr-CA" err="1" smtClean="0">
                 <a:solidFill>
                   <a:schemeClr val="bg1"/>
                 </a:solidFill>
@@ -6083,14 +6108,14 @@
               <a:t>Really</a:t>
             </a:r>
             <a:r>
-              <a:rPr lang="fr-CA" dirty="0" smtClean="0">
+              <a:rPr lang="fr-CA" smtClean="0">
                 <a:solidFill>
                   <a:schemeClr val="bg1"/>
                 </a:solidFill>
               </a:rPr>
               <a:t> ?</a:t>
             </a:r>
-            <a:endParaRPr lang="en-US" dirty="0">
+            <a:endParaRPr lang="en-US">
               <a:solidFill>
                 <a:schemeClr val="bg1"/>
               </a:solidFill>
@@ -6181,14 +6206,14 @@
           <a:lstStyle/>
           <a:p>
             <a:r>
-              <a:rPr lang="fr-CA" dirty="0" smtClean="0">
+              <a:rPr lang="fr-CA" smtClean="0">
                 <a:solidFill>
                   <a:schemeClr val="bg1"/>
                 </a:solidFill>
               </a:rPr>
               <a:t>Email, in 2016 ?</a:t>
             </a:r>
-            <a:endParaRPr lang="en-US" dirty="0">
+            <a:endParaRPr lang="en-US">
               <a:solidFill>
                 <a:schemeClr val="bg1"/>
               </a:solidFill>
@@ -6204,8 +6229,8 @@
         </p:nvSpPr>
         <p:spPr>
           <a:xfrm>
-            <a:off x="5162089" y="3990108"/>
-            <a:ext cx="1798890" cy="369332"/>
+            <a:off x="4737217" y="3980871"/>
+            <a:ext cx="2956259" cy="369332"/>
           </a:xfrm>
           <a:prstGeom prst="rect">
             <a:avLst/>
@@ -6219,22 +6244,30 @@
           <a:lstStyle/>
           <a:p>
             <a:r>
-              <a:rPr lang="fr-CA" dirty="0" smtClean="0">
+              <a:rPr lang="fr-CA" err="1" smtClean="0">
                 <a:solidFill>
                   <a:schemeClr val="bg1"/>
                 </a:solidFill>
               </a:rPr>
-              <a:t>Single </a:t>
-            </a:r>
-            <a:r>
-              <a:rPr lang="fr-CA" dirty="0" err="1" smtClean="0">
+              <a:t>SplitWise</a:t>
+            </a:r>
+            <a:r>
+              <a:rPr lang="fr-CA" smtClean="0">
+                <a:solidFill>
+                  <a:schemeClr val="bg1"/>
+                </a:solidFill>
+              </a:rPr>
+              <a:t> - Single </a:t>
+            </a:r>
+            <a:r>
+              <a:rPr lang="fr-CA" err="1" smtClean="0">
                 <a:solidFill>
                   <a:schemeClr val="bg1"/>
                 </a:solidFill>
               </a:rPr>
               <a:t>Purpose</a:t>
             </a:r>
-            <a:endParaRPr lang="en-US" dirty="0">
+            <a:endParaRPr lang="en-US">
               <a:solidFill>
                 <a:schemeClr val="bg1"/>
               </a:solidFill>
@@ -6338,10 +6371,10 @@
             <a:p>
               <a:pPr algn="ctr"/>
               <a:r>
-                <a:rPr lang="fr-CA" dirty="0" smtClean="0"/>
+                <a:rPr lang="fr-CA" smtClean="0"/>
                 <a:t>V</a:t>
               </a:r>
-              <a:endParaRPr lang="en-US" dirty="0"/>
+              <a:endParaRPr lang="en-US"/>
             </a:p>
           </p:txBody>
         </p:sp>
@@ -6417,7 +6450,7 @@
           <a:lstStyle/>
           <a:p>
             <a:r>
-              <a:rPr lang="fr-CA" sz="3600" dirty="0" smtClean="0">
+              <a:rPr lang="fr-CA" sz="3600" smtClean="0">
                 <a:solidFill>
                   <a:schemeClr val="bg1"/>
                 </a:solidFill>
@@ -6425,7 +6458,7 @@
               </a:rPr>
               <a:t>Revenue Stream</a:t>
             </a:r>
-            <a:endParaRPr lang="en-US" sz="3600" dirty="0">
+            <a:endParaRPr lang="en-US" sz="3600">
               <a:solidFill>
                 <a:schemeClr val="bg1"/>
               </a:solidFill>
@@ -6487,7 +6520,7 @@
           <a:lstStyle/>
           <a:p>
             <a:r>
-              <a:rPr lang="fr-CA" sz="4000" dirty="0" smtClean="0">
+              <a:rPr lang="fr-CA" sz="4000" smtClean="0">
                 <a:solidFill>
                   <a:schemeClr val="bg1"/>
                 </a:solidFill>
@@ -6495,7 +6528,7 @@
               </a:rPr>
               <a:t>+500M $</a:t>
             </a:r>
-            <a:endParaRPr lang="en-US" sz="4000" dirty="0">
+            <a:endParaRPr lang="en-US" sz="4000">
               <a:solidFill>
                 <a:schemeClr val="bg1"/>
               </a:solidFill>
@@ -6527,7 +6560,7 @@
           <a:lstStyle/>
           <a:p>
             <a:r>
-              <a:rPr lang="fr-CA" dirty="0" smtClean="0">
+              <a:rPr lang="fr-CA" smtClean="0">
                 <a:solidFill>
                   <a:schemeClr val="bg1"/>
                 </a:solidFill>
@@ -6536,7 +6569,7 @@
               <a:t>In </a:t>
             </a:r>
             <a:r>
-              <a:rPr lang="fr-CA" dirty="0" err="1" smtClean="0">
+              <a:rPr lang="fr-CA" err="1" smtClean="0">
                 <a:solidFill>
                   <a:schemeClr val="bg1"/>
                 </a:solidFill>
@@ -6545,7 +6578,7 @@
               <a:t>activities</a:t>
             </a:r>
             <a:r>
-              <a:rPr lang="fr-CA" dirty="0" smtClean="0">
+              <a:rPr lang="fr-CA" smtClean="0">
                 <a:solidFill>
                   <a:schemeClr val="bg1"/>
                 </a:solidFill>
@@ -6554,7 +6587,7 @@
               <a:t> (</a:t>
             </a:r>
             <a:r>
-              <a:rPr lang="fr-CA" dirty="0" err="1" smtClean="0">
+              <a:rPr lang="fr-CA" err="1" smtClean="0">
                 <a:solidFill>
                   <a:schemeClr val="bg1"/>
                 </a:solidFill>
@@ -6563,7 +6596,7 @@
               <a:t>slack</a:t>
             </a:r>
             <a:r>
-              <a:rPr lang="fr-CA" dirty="0" smtClean="0">
+              <a:rPr lang="fr-CA" smtClean="0">
                 <a:solidFill>
                   <a:schemeClr val="bg1"/>
                 </a:solidFill>
@@ -6572,7 +6605,7 @@
               <a:t> </a:t>
             </a:r>
             <a:r>
-              <a:rPr lang="fr-CA" dirty="0" err="1" smtClean="0">
+              <a:rPr lang="fr-CA" err="1" smtClean="0">
                 <a:solidFill>
                   <a:schemeClr val="bg1"/>
                 </a:solidFill>
@@ -6581,7 +6614,7 @@
               <a:t>users</a:t>
             </a:r>
             <a:r>
-              <a:rPr lang="fr-CA" dirty="0" smtClean="0">
+              <a:rPr lang="fr-CA" smtClean="0">
                 <a:solidFill>
                   <a:schemeClr val="bg1"/>
                 </a:solidFill>
@@ -6589,7 +6622,7 @@
               </a:rPr>
               <a:t>)</a:t>
             </a:r>
-            <a:endParaRPr lang="en-US" dirty="0">
+            <a:endParaRPr lang="en-US">
               <a:solidFill>
                 <a:schemeClr val="bg1"/>
               </a:solidFill>
@@ -6606,7 +6639,7 @@
         </p:nvSpPr>
         <p:spPr>
           <a:xfrm>
-            <a:off x="5464691" y="2972709"/>
+            <a:off x="5498957" y="3075676"/>
             <a:ext cx="3847528" cy="461665"/>
           </a:xfrm>
           <a:prstGeom prst="rect">
@@ -6621,7 +6654,7 @@
           <a:lstStyle/>
           <a:p>
             <a:r>
-              <a:rPr lang="fr-CA" sz="2400" dirty="0" smtClean="0">
+              <a:rPr lang="fr-CA" sz="2400" smtClean="0">
                 <a:solidFill>
                   <a:schemeClr val="bg1"/>
                 </a:solidFill>
@@ -6629,7 +6662,7 @@
               </a:rPr>
               <a:t>2% per transactions</a:t>
             </a:r>
-            <a:endParaRPr lang="en-US" sz="2400" dirty="0">
+            <a:endParaRPr lang="en-US" sz="2400">
               <a:solidFill>
                 <a:schemeClr val="bg1"/>
               </a:solidFill>
@@ -6646,7 +6679,7 @@
         </p:nvSpPr>
         <p:spPr>
           <a:xfrm>
-            <a:off x="5464691" y="3402136"/>
+            <a:off x="5451668" y="3917613"/>
             <a:ext cx="3942105" cy="461665"/>
           </a:xfrm>
           <a:prstGeom prst="rect">
@@ -6661,7 +6694,7 @@
           <a:lstStyle/>
           <a:p>
             <a:r>
-              <a:rPr lang="fr-CA" sz="2400" dirty="0" smtClean="0">
+              <a:rPr lang="fr-CA" sz="2400" smtClean="0">
                 <a:solidFill>
                   <a:schemeClr val="bg1"/>
                 </a:solidFill>
@@ -6669,7 +6702,7 @@
               </a:rPr>
               <a:t>20% conversion rate</a:t>
             </a:r>
-            <a:endParaRPr lang="en-US" sz="2400" dirty="0">
+            <a:endParaRPr lang="en-US" sz="2400">
               <a:solidFill>
                 <a:schemeClr val="bg1"/>
               </a:solidFill>
@@ -6686,7 +6719,7 @@
         </p:nvSpPr>
         <p:spPr>
           <a:xfrm>
-            <a:off x="5464691" y="3795632"/>
+            <a:off x="5464691" y="4333396"/>
             <a:ext cx="4785284" cy="461665"/>
           </a:xfrm>
           <a:prstGeom prst="rect">
@@ -6701,7 +6734,7 @@
           <a:lstStyle/>
           <a:p>
             <a:r>
-              <a:rPr lang="fr-CA" sz="2400" dirty="0">
+              <a:rPr lang="fr-CA" sz="2400">
                 <a:solidFill>
                   <a:schemeClr val="bg1"/>
                 </a:solidFill>
@@ -6710,7 +6743,7 @@
               <a:t>5</a:t>
             </a:r>
             <a:r>
-              <a:rPr lang="fr-CA" sz="2400" dirty="0" smtClean="0">
+              <a:rPr lang="fr-CA" sz="2400" smtClean="0">
                 <a:solidFill>
                   <a:schemeClr val="bg1"/>
                 </a:solidFill>
@@ -6719,7 +6752,7 @@
               <a:t>% </a:t>
             </a:r>
             <a:r>
-              <a:rPr lang="fr-CA" sz="2400" dirty="0" err="1" smtClean="0">
+              <a:rPr lang="fr-CA" sz="2400" err="1" smtClean="0">
                 <a:solidFill>
                   <a:schemeClr val="bg1"/>
                 </a:solidFill>
@@ -6728,7 +6761,7 @@
               <a:t>reach</a:t>
             </a:r>
             <a:r>
-              <a:rPr lang="fr-CA" sz="2400" dirty="0" smtClean="0">
+              <a:rPr lang="fr-CA" sz="2400" smtClean="0">
                 <a:solidFill>
                   <a:schemeClr val="bg1"/>
                 </a:solidFill>
@@ -6737,7 +6770,7 @@
               <a:t> in the first </a:t>
             </a:r>
             <a:r>
-              <a:rPr lang="fr-CA" sz="2400" dirty="0" err="1" smtClean="0">
+              <a:rPr lang="fr-CA" sz="2400" err="1" smtClean="0">
                 <a:solidFill>
                   <a:schemeClr val="bg1"/>
                 </a:solidFill>
@@ -6745,7 +6778,7 @@
               </a:rPr>
               <a:t>year</a:t>
             </a:r>
-            <a:endParaRPr lang="en-US" sz="2400" dirty="0">
+            <a:endParaRPr lang="en-US" sz="2400">
               <a:solidFill>
                 <a:schemeClr val="bg1"/>
               </a:solidFill>
@@ -6762,7 +6795,7 @@
         </p:nvSpPr>
         <p:spPr>
           <a:xfrm>
-            <a:off x="5566848" y="4623457"/>
+            <a:off x="5498957" y="5248166"/>
             <a:ext cx="3155031" cy="461665"/>
           </a:xfrm>
           <a:prstGeom prst="rect">
@@ -6777,7 +6810,7 @@
           <a:lstStyle/>
           <a:p>
             <a:r>
-              <a:rPr lang="fr-CA" sz="2400" dirty="0" smtClean="0">
+              <a:rPr lang="fr-CA" sz="2400" smtClean="0">
                 <a:solidFill>
                   <a:schemeClr val="bg1"/>
                 </a:solidFill>
@@ -6786,7 +6819,7 @@
               <a:t>+100K $ </a:t>
             </a:r>
             <a:r>
-              <a:rPr lang="fr-CA" sz="2400" dirty="0" err="1" smtClean="0">
+              <a:rPr lang="fr-CA" sz="2400" err="1" smtClean="0">
                 <a:solidFill>
                   <a:schemeClr val="bg1"/>
                 </a:solidFill>
@@ -6794,7 +6827,7 @@
               </a:rPr>
               <a:t>Anually</a:t>
             </a:r>
-            <a:endParaRPr lang="en-US" sz="2400" dirty="0">
+            <a:endParaRPr lang="en-US" sz="2400">
               <a:solidFill>
                 <a:schemeClr val="bg1"/>
               </a:solidFill>
@@ -6899,10 +6932,10 @@
             <a:p>
               <a:pPr algn="ctr"/>
               <a:r>
-                <a:rPr lang="fr-CA" dirty="0" smtClean="0"/>
+                <a:rPr lang="fr-CA" smtClean="0"/>
                 <a:t>V</a:t>
               </a:r>
-              <a:endParaRPr lang="en-US" dirty="0"/>
+              <a:endParaRPr lang="en-US"/>
             </a:p>
           </p:txBody>
         </p:sp>
@@ -6964,7 +6997,7 @@
         <p:spPr>
           <a:xfrm>
             <a:off x="4891984" y="447497"/>
-            <a:ext cx="2408032" cy="646331"/>
+            <a:ext cx="2616422" cy="646331"/>
           </a:xfrm>
           <a:prstGeom prst="rect">
             <a:avLst/>
@@ -6978,7 +7011,413 @@
           <a:lstStyle/>
           <a:p>
             <a:r>
-              <a:rPr lang="fr-CA" sz="3600" dirty="0" smtClean="0">
+              <a:rPr lang="fr-CA" sz="3600" err="1" smtClean="0">
+                <a:solidFill>
+                  <a:schemeClr val="bg1"/>
+                </a:solidFill>
+                <a:latin typeface="Verdana Pro Black" panose="020B0A04030504040204" pitchFamily="34" charset="0"/>
+              </a:rPr>
+              <a:t>Channels</a:t>
+            </a:r>
+            <a:endParaRPr lang="en-US" sz="3600">
+              <a:solidFill>
+                <a:schemeClr val="bg1"/>
+              </a:solidFill>
+              <a:latin typeface="Verdana Pro Black" panose="020B0A04030504040204" pitchFamily="34" charset="0"/>
+            </a:endParaRPr>
+          </a:p>
+        </p:txBody>
+      </p:sp>
+      <p:pic>
+        <p:nvPicPr>
+          <p:cNvPr id="10" name="Image 9"/>
+          <p:cNvPicPr>
+            <a:picLocks noChangeAspect="1"/>
+          </p:cNvPicPr>
+          <p:nvPr/>
+        </p:nvPicPr>
+        <p:blipFill>
+          <a:blip r:embed="rId4" cstate="print">
+            <a:extLst>
+              <a:ext uri="{28A0092B-C50C-407E-A947-70E740481C1C}">
+                <a14:useLocalDpi xmlns:a14="http://schemas.microsoft.com/office/drawing/2010/main" val="0"/>
+              </a:ext>
+            </a:extLst>
+          </a:blip>
+          <a:stretch>
+            <a:fillRect/>
+          </a:stretch>
+        </p:blipFill>
+        <p:spPr>
+          <a:xfrm>
+            <a:off x="6012060" y="1452607"/>
+            <a:ext cx="3943193" cy="2736688"/>
+          </a:xfrm>
+          <a:prstGeom prst="rect">
+            <a:avLst/>
+          </a:prstGeom>
+        </p:spPr>
+      </p:pic>
+      <p:sp>
+        <p:nvSpPr>
+          <p:cNvPr id="11" name="ZoneTexte 10"/>
+          <p:cNvSpPr txBox="1"/>
+          <p:nvPr/>
+        </p:nvSpPr>
+        <p:spPr>
+          <a:xfrm>
+            <a:off x="6453819" y="4491191"/>
+            <a:ext cx="3140603" cy="830997"/>
+          </a:xfrm>
+          <a:prstGeom prst="rect">
+            <a:avLst/>
+          </a:prstGeom>
+          <a:noFill/>
+        </p:spPr>
+        <p:txBody>
+          <a:bodyPr wrap="none" rtlCol="0">
+            <a:spAutoFit/>
+          </a:bodyPr>
+          <a:lstStyle/>
+          <a:p>
+            <a:pPr algn="ctr"/>
+            <a:r>
+              <a:rPr lang="fr-CA" sz="2400" smtClean="0">
+                <a:solidFill>
+                  <a:schemeClr val="bg1"/>
+                </a:solidFill>
+                <a:latin typeface="Verdana Pro Black" panose="020B0A04030504040204" pitchFamily="34" charset="0"/>
+              </a:rPr>
+              <a:t>Explosion in the </a:t>
+            </a:r>
+          </a:p>
+          <a:p>
+            <a:pPr algn="ctr"/>
+            <a:r>
+              <a:rPr lang="fr-CA" sz="2400" err="1" smtClean="0">
+                <a:solidFill>
+                  <a:schemeClr val="bg1"/>
+                </a:solidFill>
+                <a:latin typeface="Verdana Pro Black" panose="020B0A04030504040204" pitchFamily="34" charset="0"/>
+              </a:rPr>
+              <a:t>Slack</a:t>
+            </a:r>
+            <a:r>
+              <a:rPr lang="fr-CA" sz="2400" smtClean="0">
+                <a:solidFill>
+                  <a:schemeClr val="bg1"/>
+                </a:solidFill>
+                <a:latin typeface="Verdana Pro Black" panose="020B0A04030504040204" pitchFamily="34" charset="0"/>
+              </a:rPr>
+              <a:t> Team</a:t>
+            </a:r>
+            <a:endParaRPr lang="en-US" sz="2400">
+              <a:solidFill>
+                <a:schemeClr val="bg1"/>
+              </a:solidFill>
+              <a:latin typeface="Verdana Pro Black" panose="020B0A04030504040204" pitchFamily="34" charset="0"/>
+            </a:endParaRPr>
+          </a:p>
+        </p:txBody>
+      </p:sp>
+      <p:pic>
+        <p:nvPicPr>
+          <p:cNvPr id="12" name="Image 11"/>
+          <p:cNvPicPr>
+            <a:picLocks noChangeAspect="1"/>
+          </p:cNvPicPr>
+          <p:nvPr/>
+        </p:nvPicPr>
+        <p:blipFill>
+          <a:blip r:embed="rId5" cstate="print">
+            <a:extLst>
+              <a:ext uri="{28A0092B-C50C-407E-A947-70E740481C1C}">
+                <a14:useLocalDpi xmlns:a14="http://schemas.microsoft.com/office/drawing/2010/main" val="0"/>
+              </a:ext>
+            </a:extLst>
+          </a:blip>
+          <a:stretch>
+            <a:fillRect/>
+          </a:stretch>
+        </p:blipFill>
+        <p:spPr>
+          <a:xfrm>
+            <a:off x="2033905" y="1093828"/>
+            <a:ext cx="3064326" cy="3374707"/>
+          </a:xfrm>
+          <a:prstGeom prst="rect">
+            <a:avLst/>
+          </a:prstGeom>
+        </p:spPr>
+      </p:pic>
+      <p:sp>
+        <p:nvSpPr>
+          <p:cNvPr id="13" name="ZoneTexte 12"/>
+          <p:cNvSpPr txBox="1"/>
+          <p:nvPr/>
+        </p:nvSpPr>
+        <p:spPr>
+          <a:xfrm>
+            <a:off x="1587449" y="4468535"/>
+            <a:ext cx="3445174" cy="830997"/>
+          </a:xfrm>
+          <a:prstGeom prst="rect">
+            <a:avLst/>
+          </a:prstGeom>
+          <a:noFill/>
+        </p:spPr>
+        <p:txBody>
+          <a:bodyPr wrap="none" rtlCol="0">
+            <a:spAutoFit/>
+          </a:bodyPr>
+          <a:lstStyle/>
+          <a:p>
+            <a:pPr algn="ctr"/>
+            <a:r>
+              <a:rPr lang="fr-CA" sz="2400" err="1" smtClean="0">
+                <a:solidFill>
+                  <a:schemeClr val="bg1"/>
+                </a:solidFill>
+                <a:latin typeface="Verdana Pro Black" panose="020B0A04030504040204" pitchFamily="34" charset="0"/>
+              </a:rPr>
+              <a:t>Promote</a:t>
+            </a:r>
+            <a:r>
+              <a:rPr lang="fr-CA" sz="2400" smtClean="0">
+                <a:solidFill>
+                  <a:schemeClr val="bg1"/>
+                </a:solidFill>
+                <a:latin typeface="Verdana Pro Black" panose="020B0A04030504040204" pitchFamily="34" charset="0"/>
+              </a:rPr>
+              <a:t> </a:t>
+            </a:r>
+            <a:r>
+              <a:rPr lang="fr-CA" sz="2400" err="1" smtClean="0">
+                <a:solidFill>
+                  <a:schemeClr val="bg1"/>
+                </a:solidFill>
+                <a:latin typeface="Verdana Pro Black" panose="020B0A04030504040204" pitchFamily="34" charset="0"/>
+              </a:rPr>
+              <a:t>with</a:t>
+            </a:r>
+            <a:r>
+              <a:rPr lang="fr-CA" sz="2400" smtClean="0">
+                <a:solidFill>
+                  <a:schemeClr val="bg1"/>
+                </a:solidFill>
+                <a:latin typeface="Verdana Pro Black" panose="020B0A04030504040204" pitchFamily="34" charset="0"/>
+              </a:rPr>
+              <a:t> Max</a:t>
+            </a:r>
+          </a:p>
+          <a:p>
+            <a:pPr algn="ctr"/>
+            <a:r>
+              <a:rPr lang="fr-CA" sz="2400" smtClean="0">
+                <a:solidFill>
+                  <a:schemeClr val="bg1"/>
+                </a:solidFill>
+                <a:latin typeface="Verdana Pro Black" panose="020B0A04030504040204" pitchFamily="34" charset="0"/>
+              </a:rPr>
+              <a:t>Use case in </a:t>
+            </a:r>
+            <a:r>
+              <a:rPr lang="fr-CA" sz="2400" err="1" smtClean="0">
+                <a:solidFill>
+                  <a:schemeClr val="bg1"/>
+                </a:solidFill>
+                <a:latin typeface="Verdana Pro Black" panose="020B0A04030504040204" pitchFamily="34" charset="0"/>
+              </a:rPr>
+              <a:t>Video</a:t>
+            </a:r>
+            <a:r>
+              <a:rPr lang="fr-CA" sz="2400" smtClean="0">
+                <a:solidFill>
+                  <a:schemeClr val="bg1"/>
+                </a:solidFill>
+                <a:latin typeface="Verdana Pro Black" panose="020B0A04030504040204" pitchFamily="34" charset="0"/>
+              </a:rPr>
+              <a:t>.</a:t>
+            </a:r>
+          </a:p>
+        </p:txBody>
+      </p:sp>
+    </p:spTree>
+    <p:extLst>
+      <p:ext uri="{BB962C8B-B14F-4D97-AF65-F5344CB8AC3E}">
+        <p14:creationId xmlns:p14="http://schemas.microsoft.com/office/powerpoint/2010/main" val="3443920537"/>
+      </p:ext>
+    </p:extLst>
+  </p:cSld>
+  <p:clrMapOvr>
+    <a:masterClrMapping/>
+  </p:clrMapOvr>
+  <p:timing>
+    <p:tnLst>
+      <p:par>
+        <p:cTn id="1" dur="indefinite" restart="never" nodeType="tmRoot"/>
+      </p:par>
+    </p:tnLst>
+  </p:timing>
+</p:sld>
+</file>
+
+<file path=ppt/slides/slide9.xml><?xml version="1.0" encoding="utf-8"?>
+<p:sld xmlns:a="http://schemas.openxmlformats.org/drawingml/2006/main" xmlns:r="http://schemas.openxmlformats.org/officeDocument/2006/relationships" xmlns:p="http://schemas.openxmlformats.org/presentationml/2006/main">
+  <p:cSld>
+    <p:spTree>
+      <p:nvGrpSpPr>
+        <p:cNvPr id="1" name=""/>
+        <p:cNvGrpSpPr/>
+        <p:nvPr/>
+      </p:nvGrpSpPr>
+      <p:grpSpPr>
+        <a:xfrm>
+          <a:off x="0" y="0"/>
+          <a:ext cx="0" cy="0"/>
+          <a:chOff x="0" y="0"/>
+          <a:chExt cx="0" cy="0"/>
+        </a:xfrm>
+      </p:grpSpPr>
+      <p:grpSp>
+        <p:nvGrpSpPr>
+          <p:cNvPr id="4" name="Groupe 3"/>
+          <p:cNvGrpSpPr/>
+          <p:nvPr/>
+        </p:nvGrpSpPr>
+        <p:grpSpPr>
+          <a:xfrm>
+            <a:off x="0" y="0"/>
+            <a:ext cx="12192000" cy="6858000"/>
+            <a:chOff x="0" y="0"/>
+            <a:chExt cx="12192000" cy="6858000"/>
+          </a:xfrm>
+        </p:grpSpPr>
+        <p:sp>
+          <p:nvSpPr>
+            <p:cNvPr id="5" name="Rectangle 4"/>
+            <p:cNvSpPr/>
+            <p:nvPr/>
+          </p:nvSpPr>
+          <p:spPr>
+            <a:xfrm>
+              <a:off x="0" y="0"/>
+              <a:ext cx="12192000" cy="6858000"/>
+            </a:xfrm>
+            <a:prstGeom prst="rect">
+              <a:avLst/>
+            </a:prstGeom>
+            <a:solidFill>
+              <a:schemeClr val="tx1"/>
+            </a:solidFill>
+            <a:ln>
+              <a:solidFill>
+                <a:schemeClr val="tx1"/>
+              </a:solidFill>
+            </a:ln>
+          </p:spPr>
+          <p:style>
+            <a:lnRef idx="2">
+              <a:schemeClr val="accent1">
+                <a:shade val="50000"/>
+              </a:schemeClr>
+            </a:lnRef>
+            <a:fillRef idx="1">
+              <a:schemeClr val="accent1"/>
+            </a:fillRef>
+            <a:effectRef idx="0">
+              <a:schemeClr val="accent1"/>
+            </a:effectRef>
+            <a:fontRef idx="minor">
+              <a:schemeClr val="lt1"/>
+            </a:fontRef>
+          </p:style>
+          <p:txBody>
+            <a:bodyPr rtlCol="0" anchor="ctr"/>
+            <a:lstStyle/>
+            <a:p>
+              <a:pPr algn="ctr"/>
+              <a:r>
+                <a:rPr lang="fr-CA" smtClean="0"/>
+                <a:t>V</a:t>
+              </a:r>
+              <a:endParaRPr lang="en-US"/>
+            </a:p>
+          </p:txBody>
+        </p:sp>
+        <p:pic>
+          <p:nvPicPr>
+            <p:cNvPr id="6" name="Image 5"/>
+            <p:cNvPicPr>
+              <a:picLocks noChangeAspect="1"/>
+            </p:cNvPicPr>
+            <p:nvPr/>
+          </p:nvPicPr>
+          <p:blipFill>
+            <a:blip r:embed="rId2"/>
+            <a:stretch>
+              <a:fillRect/>
+            </a:stretch>
+          </p:blipFill>
+          <p:spPr>
+            <a:xfrm>
+              <a:off x="293122" y="5945329"/>
+              <a:ext cx="3667125" cy="704850"/>
+            </a:xfrm>
+            <a:prstGeom prst="rect">
+              <a:avLst/>
+            </a:prstGeom>
+          </p:spPr>
+        </p:pic>
+        <p:pic>
+          <p:nvPicPr>
+            <p:cNvPr id="7" name="Image 6"/>
+            <p:cNvPicPr>
+              <a:picLocks noChangeAspect="1"/>
+            </p:cNvPicPr>
+            <p:nvPr/>
+          </p:nvPicPr>
+          <p:blipFill>
+            <a:blip r:embed="rId3"/>
+            <a:stretch>
+              <a:fillRect/>
+            </a:stretch>
+          </p:blipFill>
+          <p:spPr>
+            <a:xfrm>
+              <a:off x="9008341" y="6031054"/>
+              <a:ext cx="2857500" cy="533400"/>
+            </a:xfrm>
+            <a:prstGeom prst="rect">
+              <a:avLst/>
+            </a:prstGeom>
+          </p:spPr>
+        </p:pic>
+      </p:grpSp>
+      <p:sp>
+        <p:nvSpPr>
+          <p:cNvPr id="8" name="ZoneTexte 7"/>
+          <p:cNvSpPr txBox="1"/>
+          <p:nvPr/>
+        </p:nvSpPr>
+        <p:spPr>
+          <a:xfrm>
+            <a:off x="4891984" y="447497"/>
+            <a:ext cx="2408032" cy="646331"/>
+          </a:xfrm>
+          <a:prstGeom prst="rect">
+            <a:avLst/>
+          </a:prstGeom>
+          <a:noFill/>
+        </p:spPr>
+        <p:txBody>
+          <a:bodyPr wrap="none" rtlCol="0">
+            <a:spAutoFit/>
+          </a:bodyPr>
+          <a:lstStyle/>
+          <a:p>
+            <a:r>
+              <a:rPr lang="fr-CA" sz="3600" smtClean="0">
                 <a:solidFill>
                   <a:schemeClr val="bg1"/>
                 </a:solidFill>
@@ -6986,7 +7425,7 @@
               </a:rPr>
               <a:t>Traction</a:t>
             </a:r>
-            <a:endParaRPr lang="en-US" sz="3600" dirty="0">
+            <a:endParaRPr lang="en-US" sz="3600">
               <a:solidFill>
                 <a:schemeClr val="bg1"/>
               </a:solidFill>
@@ -7048,7 +7487,7 @@
           <a:lstStyle/>
           <a:p>
             <a:r>
-              <a:rPr lang="fr-CA" dirty="0" err="1" smtClean="0">
+              <a:rPr lang="fr-CA" err="1" smtClean="0">
                 <a:solidFill>
                   <a:schemeClr val="bg1"/>
                 </a:solidFill>
@@ -7057,7 +7496,7 @@
               <a:t>Slackathon</a:t>
             </a:r>
             <a:r>
-              <a:rPr lang="fr-CA" dirty="0" smtClean="0">
+              <a:rPr lang="fr-CA" smtClean="0">
                 <a:solidFill>
                   <a:schemeClr val="bg1"/>
                 </a:solidFill>
@@ -7065,7 +7504,7 @@
               </a:rPr>
               <a:t> Feedback</a:t>
             </a:r>
-            <a:endParaRPr lang="en-US" dirty="0">
+            <a:endParaRPr lang="en-US">
               <a:solidFill>
                 <a:schemeClr val="bg1"/>
               </a:solidFill>
@@ -7098,7 +7537,7 @@
           <a:p>
             <a:pPr algn="ctr"/>
             <a:r>
-              <a:rPr lang="fr-CA" dirty="0" smtClean="0">
+              <a:rPr lang="fr-CA" smtClean="0">
                 <a:solidFill>
                   <a:schemeClr val="bg1"/>
                 </a:solidFill>
@@ -7110,7 +7549,7 @@
           <a:p>
             <a:pPr algn="ctr"/>
             <a:r>
-              <a:rPr lang="fr-CA" dirty="0" err="1" smtClean="0">
+              <a:rPr lang="fr-CA" err="1" smtClean="0">
                 <a:solidFill>
                   <a:schemeClr val="bg1"/>
                 </a:solidFill>
@@ -7118,7 +7557,7 @@
               </a:rPr>
               <a:t>growth</a:t>
             </a:r>
-            <a:endParaRPr lang="en-US" dirty="0">
+            <a:endParaRPr lang="en-US">
               <a:solidFill>
                 <a:schemeClr val="bg1"/>
               </a:solidFill>

</xml_diff>